<commit_message>
minor corrections to two slides
</commit_message>
<xml_diff>
--- a/PowerPoints/11 - Code Generation.pptx
+++ b/PowerPoints/11 - Code Generation.pptx
@@ -65,7 +65,7 @@
     <p:sldId id="306" r:id="rId53"/>
   </p:sldIdLst>
   <p:sldSz cx="9144000" cy="6858000" type="screen4x3"/>
-  <p:notesSz cx="7010400" cy="9296400"/>
+  <p:notesSz cx="7315200" cy="9601200"/>
   <p:defaultTextStyle>
     <a:defPPr>
       <a:defRPr lang="en-US"/>
@@ -208,12 +208,12 @@
     </p:ext>
     <p:ext uri="{2D200454-40CA-4A62-9FC3-DE9A4176ACB9}">
       <p15:notesGuideLst xmlns:p15="http://schemas.microsoft.com/office/powerpoint/2012/main">
-        <p15:guide id="1" orient="horz" pos="2928" userDrawn="1">
+        <p15:guide id="1" orient="horz" pos="3024" userDrawn="1">
           <p15:clr>
             <a:srgbClr val="A4A3A4"/>
           </p15:clr>
         </p15:guide>
-        <p15:guide id="2" pos="2208" userDrawn="1">
+        <p15:guide id="2" pos="2304" userDrawn="1">
           <p15:clr>
             <a:srgbClr val="A4A3A4"/>
           </p15:clr>
@@ -261,8 +261,8 @@
         </p:nvSpPr>
         <p:spPr bwMode="auto">
           <a:xfrm>
-            <a:off x="3971926" y="0"/>
-            <a:ext cx="3038475" cy="465138"/>
+            <a:off x="4144619" y="0"/>
+            <a:ext cx="3170583" cy="480388"/>
           </a:xfrm>
           <a:prstGeom prst="rect">
             <a:avLst/>
@@ -277,13 +277,13 @@
           <a:effectLst/>
         </p:spPr>
         <p:txBody>
-          <a:bodyPr vert="horz" wrap="square" lIns="93164" tIns="46582" rIns="93164" bIns="46582" numCol="1" anchor="t" anchorCtr="0" compatLnSpc="1">
+          <a:bodyPr vert="horz" wrap="square" lIns="96639" tIns="48320" rIns="96639" bIns="48320" numCol="1" anchor="t" anchorCtr="0" compatLnSpc="1">
             <a:prstTxWarp prst="textNoShape">
               <a:avLst/>
             </a:prstTxWarp>
           </a:bodyPr>
           <a:lstStyle>
-            <a:lvl1pPr algn="r" defTabSz="931726">
+            <a:lvl1pPr algn="r" defTabSz="966479">
               <a:defRPr sz="1200"/>
             </a:lvl1pPr>
           </a:lstStyle>
@@ -312,8 +312,8 @@
         </p:nvSpPr>
         <p:spPr bwMode="auto">
           <a:xfrm>
-            <a:off x="3971926" y="8831264"/>
-            <a:ext cx="3038475" cy="465137"/>
+            <a:off x="4144619" y="9120814"/>
+            <a:ext cx="3170583" cy="480387"/>
           </a:xfrm>
           <a:prstGeom prst="rect">
             <a:avLst/>
@@ -328,13 +328,13 @@
           <a:effectLst/>
         </p:spPr>
         <p:txBody>
-          <a:bodyPr vert="horz" wrap="square" lIns="93164" tIns="46582" rIns="93164" bIns="46582" numCol="1" anchor="b" anchorCtr="0" compatLnSpc="1">
+          <a:bodyPr vert="horz" wrap="square" lIns="96639" tIns="48320" rIns="96639" bIns="48320" numCol="1" anchor="b" anchorCtr="0" compatLnSpc="1">
             <a:prstTxWarp prst="textNoShape">
               <a:avLst/>
             </a:prstTxWarp>
           </a:bodyPr>
           <a:lstStyle>
-            <a:lvl1pPr algn="r" defTabSz="931726">
+            <a:lvl1pPr algn="r" defTabSz="966479">
               <a:defRPr sz="1200"/>
             </a:lvl1pPr>
           </a:lstStyle>
@@ -412,7 +412,7 @@
         <p:spPr bwMode="auto">
           <a:xfrm>
             <a:off x="1" y="0"/>
-            <a:ext cx="3038475" cy="465138"/>
+            <a:ext cx="3170583" cy="480388"/>
           </a:xfrm>
           <a:prstGeom prst="rect">
             <a:avLst/>
@@ -427,13 +427,13 @@
           <a:effectLst/>
         </p:spPr>
         <p:txBody>
-          <a:bodyPr vert="horz" wrap="square" lIns="93164" tIns="46582" rIns="93164" bIns="46582" numCol="1" anchor="t" anchorCtr="0" compatLnSpc="1">
+          <a:bodyPr vert="horz" wrap="square" lIns="96639" tIns="48320" rIns="96639" bIns="48320" numCol="1" anchor="t" anchorCtr="0" compatLnSpc="1">
             <a:prstTxWarp prst="textNoShape">
               <a:avLst/>
             </a:prstTxWarp>
           </a:bodyPr>
           <a:lstStyle>
-            <a:lvl1pPr algn="l" defTabSz="931726">
+            <a:lvl1pPr algn="l" defTabSz="966479">
               <a:defRPr sz="1200"/>
             </a:lvl1pPr>
           </a:lstStyle>
@@ -460,8 +460,8 @@
         </p:nvSpPr>
         <p:spPr bwMode="auto">
           <a:xfrm>
-            <a:off x="3971926" y="0"/>
-            <a:ext cx="3038475" cy="465138"/>
+            <a:off x="4144619" y="0"/>
+            <a:ext cx="3170583" cy="480388"/>
           </a:xfrm>
           <a:prstGeom prst="rect">
             <a:avLst/>
@@ -476,13 +476,13 @@
           <a:effectLst/>
         </p:spPr>
         <p:txBody>
-          <a:bodyPr vert="horz" wrap="square" lIns="93164" tIns="46582" rIns="93164" bIns="46582" numCol="1" anchor="t" anchorCtr="0" compatLnSpc="1">
+          <a:bodyPr vert="horz" wrap="square" lIns="96639" tIns="48320" rIns="96639" bIns="48320" numCol="1" anchor="t" anchorCtr="0" compatLnSpc="1">
             <a:prstTxWarp prst="textNoShape">
               <a:avLst/>
             </a:prstTxWarp>
           </a:bodyPr>
           <a:lstStyle>
-            <a:lvl1pPr algn="r" defTabSz="931726">
+            <a:lvl1pPr algn="r" defTabSz="966479">
               <a:defRPr sz="1200"/>
             </a:lvl1pPr>
           </a:lstStyle>
@@ -506,8 +506,8 @@
         </p:nvSpPr>
         <p:spPr bwMode="auto">
           <a:xfrm>
-            <a:off x="1181100" y="696913"/>
-            <a:ext cx="4648200" cy="3486150"/>
+            <a:off x="1257300" y="719138"/>
+            <a:ext cx="4800600" cy="3600450"/>
           </a:xfrm>
           <a:prstGeom prst="rect">
             <a:avLst/>
@@ -535,8 +535,8 @@
         </p:nvSpPr>
         <p:spPr bwMode="auto">
           <a:xfrm>
-            <a:off x="935039" y="4416426"/>
-            <a:ext cx="5140325" cy="4183063"/>
+            <a:off x="975694" y="4561227"/>
+            <a:ext cx="5363817" cy="4320213"/>
           </a:xfrm>
           <a:prstGeom prst="rect">
             <a:avLst/>
@@ -551,7 +551,7 @@
           <a:effectLst/>
         </p:spPr>
         <p:txBody>
-          <a:bodyPr vert="horz" wrap="square" lIns="93164" tIns="46582" rIns="93164" bIns="46582" numCol="1" anchor="t" anchorCtr="0" compatLnSpc="1">
+          <a:bodyPr vert="horz" wrap="square" lIns="96639" tIns="48320" rIns="96639" bIns="48320" numCol="1" anchor="t" anchorCtr="0" compatLnSpc="1">
             <a:prstTxWarp prst="textNoShape">
               <a:avLst/>
             </a:prstTxWarp>
@@ -606,8 +606,8 @@
         </p:nvSpPr>
         <p:spPr bwMode="auto">
           <a:xfrm>
-            <a:off x="1" y="8831264"/>
-            <a:ext cx="3038475" cy="465137"/>
+            <a:off x="1" y="9120814"/>
+            <a:ext cx="3170583" cy="480387"/>
           </a:xfrm>
           <a:prstGeom prst="rect">
             <a:avLst/>
@@ -622,13 +622,13 @@
           <a:effectLst/>
         </p:spPr>
         <p:txBody>
-          <a:bodyPr vert="horz" wrap="square" lIns="93164" tIns="46582" rIns="93164" bIns="46582" numCol="1" anchor="b" anchorCtr="0" compatLnSpc="1">
+          <a:bodyPr vert="horz" wrap="square" lIns="96639" tIns="48320" rIns="96639" bIns="48320" numCol="1" anchor="b" anchorCtr="0" compatLnSpc="1">
             <a:prstTxWarp prst="textNoShape">
               <a:avLst/>
             </a:prstTxWarp>
           </a:bodyPr>
           <a:lstStyle>
-            <a:lvl1pPr algn="l" defTabSz="931726">
+            <a:lvl1pPr algn="l" defTabSz="966479">
               <a:defRPr sz="1200"/>
             </a:lvl1pPr>
           </a:lstStyle>
@@ -652,8 +652,8 @@
         </p:nvSpPr>
         <p:spPr bwMode="auto">
           <a:xfrm>
-            <a:off x="3971926" y="8831264"/>
-            <a:ext cx="3038475" cy="465137"/>
+            <a:off x="4144619" y="9120814"/>
+            <a:ext cx="3170583" cy="480387"/>
           </a:xfrm>
           <a:prstGeom prst="rect">
             <a:avLst/>
@@ -668,13 +668,13 @@
           <a:effectLst/>
         </p:spPr>
         <p:txBody>
-          <a:bodyPr vert="horz" wrap="square" lIns="93164" tIns="46582" rIns="93164" bIns="46582" numCol="1" anchor="b" anchorCtr="0" compatLnSpc="1">
+          <a:bodyPr vert="horz" wrap="square" lIns="96639" tIns="48320" rIns="96639" bIns="48320" numCol="1" anchor="b" anchorCtr="0" compatLnSpc="1">
             <a:prstTxWarp prst="textNoShape">
               <a:avLst/>
             </a:prstTxWarp>
           </a:bodyPr>
           <a:lstStyle>
-            <a:lvl1pPr algn="r" defTabSz="931726">
+            <a:lvl1pPr algn="r" defTabSz="966479">
               <a:defRPr sz="1200"/>
             </a:lvl1pPr>
           </a:lstStyle>
@@ -11655,7 +11655,7 @@
             </a:r>
             <a:r>
               <a:rPr lang="en-US" dirty="0"/>
-              <a:t>, all variables can use this instruction since they all have PROGRAM scope.</a:t>
+              <a:t>, all variables can use this instruction since they all have GLOBAL scope.</a:t>
             </a:r>
           </a:p>
           <a:p>
@@ -11946,7 +11946,7 @@
               <a:rPr lang="en-US" dirty="0">
                 <a:latin typeface="Consolas" panose="020B0609020204030204" pitchFamily="49" charset="0"/>
               </a:rPr>
-              <a:t>SUBPROGRAM</a:t>
+              <a:t>LOCAL</a:t>
             </a:r>
             <a:r>
               <a:rPr lang="en-US" dirty="0"/>

</xml_diff>

<commit_message>
improvements to one PowerPoint slide
</commit_message>
<xml_diff>
--- a/PowerPoints/11 - Code Generation.pptx
+++ b/PowerPoints/11 - Code Generation.pptx
@@ -21794,24 +21794,29 @@
             <p:ph idx="1"/>
           </p:nvPr>
         </p:nvSpPr>
-        <p:spPr/>
-        <p:txBody>
-          <a:bodyPr/>
-          <a:lstStyle/>
-          <a:p>
-            <a:r>
-              <a:rPr lang="en-US" sz="2350" dirty="0"/>
+        <p:spPr>
+          <a:xfrm>
+            <a:off x="458788" y="1363663"/>
+            <a:ext cx="8321040" cy="4935537"/>
+          </a:xfrm>
+        </p:spPr>
+        <p:txBody>
+          <a:bodyPr/>
+          <a:lstStyle/>
+          <a:p>
+            <a:r>
+              <a:rPr lang="en-US" dirty="0"/>
               <a:t>Class </a:t>
             </a:r>
             <a:r>
-              <a:rPr lang="en-US" sz="2350" dirty="0">
+              <a:rPr lang="en-US" dirty="0">
                 <a:latin typeface="Consolas" pitchFamily="49" charset="0"/>
                 <a:cs typeface="Consolas" pitchFamily="49" charset="0"/>
               </a:rPr>
               <a:t>AST</a:t>
             </a:r>
             <a:r>
-              <a:rPr lang="en-US" sz="2350" dirty="0"/>
+              <a:rPr lang="en-US" dirty="0"/>
               <a:t> defines four methods that write assembly language to the target file.</a:t>
             </a:r>
           </a:p>
@@ -21920,34 +21925,23 @@
           </a:p>
           <a:p>
             <a:r>
-              <a:rPr lang="en-US" sz="2350" dirty="0"/>
-              <a:t>Since all AST classes are subclasses (either directly or indirectly) of class </a:t>
-            </a:r>
-            <a:r>
-              <a:rPr lang="en-US" sz="2350" dirty="0">
-                <a:latin typeface="Consolas" pitchFamily="49" charset="0"/>
-                <a:cs typeface="Consolas" pitchFamily="49" charset="0"/>
-              </a:rPr>
-              <a:t>AST</a:t>
-            </a:r>
-            <a:r>
-              <a:rPr lang="en-US" sz="2350" dirty="0"/>
-              <a:t>, then all AST classes inherit these code-generation methods.</a:t>
-            </a:r>
-          </a:p>
-          <a:p>
-            <a:r>
-              <a:rPr lang="en-US" sz="2350" dirty="0"/>
+              <a:rPr lang="en-US" dirty="0"/>
+              <a:t>All AST classes inherit these code-generation methods.</a:t>
+            </a:r>
+          </a:p>
+          <a:p>
+            <a:r>
+              <a:rPr lang="en-US" dirty="0"/>
               <a:t>All </a:t>
             </a:r>
             <a:r>
-              <a:rPr lang="en-US" sz="2350" dirty="0">
+              <a:rPr lang="en-US" dirty="0">
                 <a:latin typeface="Consolas" panose="020B0609020204030204" pitchFamily="49" charset="0"/>
               </a:rPr>
               <a:t>emit()</a:t>
             </a:r>
             <a:r>
-              <a:rPr lang="en-US" sz="2350" dirty="0"/>
+              <a:rPr lang="en-US" dirty="0"/>
               <a:t> methods involved in code generation must call one or more of these methods, or they must call another method that calls one or more of these methods, to write out the assembly language during code generation.</a:t>
             </a:r>
           </a:p>

</xml_diff>

<commit_message>
updated two PowerPoint slides
</commit_message>
<xml_diff>
--- a/PowerPoints/11 - Code Generation.pptx
+++ b/PowerPoints/11 - Code Generation.pptx
@@ -12325,7 +12325,7 @@
                 <a:latin typeface="Consolas" pitchFamily="49" charset="0"/>
                 <a:cs typeface="Consolas" pitchFamily="49" charset="0"/>
               </a:rPr>
-              <a:t>getLiteralIntValue</a:t>
+              <a:t>getIntValue</a:t>
             </a:r>
             <a:r>
               <a:rPr lang="en-US" dirty="0">
@@ -12664,7 +12664,7 @@
                 <a:latin typeface="Consolas" pitchFamily="49" charset="0"/>
                 <a:cs typeface="Consolas" pitchFamily="49" charset="0"/>
               </a:rPr>
-              <a:t>getLiteralIntValue</a:t>
+              <a:t>getIntValue</a:t>
             </a:r>
             <a:r>
               <a:rPr lang="en-US" sz="1800" dirty="0">
@@ -12731,7 +12731,21 @@
                 <a:latin typeface="Consolas" pitchFamily="49" charset="0"/>
                 <a:cs typeface="Consolas" pitchFamily="49" charset="0"/>
               </a:rPr>
-              <a:t>        emit("LDCB " + getLiteralIntValue());</a:t>
+              <a:t>        emit("LDCB " + </a:t>
+            </a:r>
+            <a:r>
+              <a:rPr lang="en-US" sz="1800">
+                <a:latin typeface="Consolas" pitchFamily="49" charset="0"/>
+                <a:cs typeface="Consolas" pitchFamily="49" charset="0"/>
+              </a:rPr>
+              <a:t>getIntValue</a:t>
+            </a:r>
+            <a:r>
+              <a:rPr lang="en-US" sz="1800" dirty="0">
+                <a:latin typeface="Consolas" pitchFamily="49" charset="0"/>
+                <a:cs typeface="Consolas" pitchFamily="49" charset="0"/>
+              </a:rPr>
+              <a:t>());</a:t>
             </a:r>
           </a:p>
           <a:p>

</xml_diff>

<commit_message>
updates to a couple of slides
</commit_message>
<xml_diff>
--- a/PowerPoints/11 - Code Generation.pptx
+++ b/PowerPoints/11 - Code Generation.pptx
@@ -12852,7 +12852,7 @@
               <a:t>        emit("LDCB " + </a:t>
             </a:r>
             <a:r>
-              <a:rPr lang="en-US" sz="1800">
+              <a:rPr lang="en-US" sz="1800" dirty="0" err="1">
                 <a:latin typeface="Consolas" pitchFamily="49" charset="0"/>
                 <a:cs typeface="Consolas" pitchFamily="49" charset="0"/>
               </a:rPr>
@@ -12967,14 +12967,28 @@
                 <a:latin typeface="Consolas" pitchFamily="49" charset="0"/>
                 <a:cs typeface="Consolas" pitchFamily="49" charset="0"/>
               </a:rPr>
-              <a:t> == </a:t>
+              <a:t> </a:t>
             </a:r>
             <a:r>
               <a:rPr lang="en-US" sz="1800" dirty="0" err="1">
                 <a:latin typeface="Consolas" pitchFamily="49" charset="0"/>
                 <a:cs typeface="Consolas" pitchFamily="49" charset="0"/>
               </a:rPr>
-              <a:t>Type.String</a:t>
+              <a:t>instanceof</a:t>
+            </a:r>
+            <a:r>
+              <a:rPr lang="en-US" sz="1800" dirty="0">
+                <a:latin typeface="Consolas" pitchFamily="49" charset="0"/>
+                <a:cs typeface="Consolas" pitchFamily="49" charset="0"/>
+              </a:rPr>
+              <a:t> </a:t>
+            </a:r>
+            <a:r>
+              <a:rPr lang="en-US" sz="1800" dirty="0" err="1">
+                <a:latin typeface="Consolas" pitchFamily="49" charset="0"/>
+                <a:cs typeface="Consolas" pitchFamily="49" charset="0"/>
+              </a:rPr>
+              <a:t>StringType</a:t>
             </a:r>
             <a:r>
               <a:rPr lang="en-US" sz="1800" dirty="0">
@@ -13959,7 +13973,7 @@
           <a:p>
             <a:r>
               <a:rPr lang="en-US" dirty="0"/>
-              <a:t>A binary expression contains an operator and one operand, where the operand is an expression.</a:t>
+              <a:t>A unary expression contains an operator and one operand, where the operand is an expression.</a:t>
             </a:r>
           </a:p>
           <a:p>
@@ -22102,7 +22116,7 @@
         </p:nvSpPr>
         <p:spPr>
           <a:xfrm>
-            <a:off x="458788" y="1363663"/>
+            <a:off x="458787" y="1363663"/>
             <a:ext cx="8321040" cy="4935537"/>
           </a:xfrm>
         </p:spPr>

</xml_diff>